<commit_message>
Add title page for video on using sos within sos notebook
</commit_message>
<xml_diff>
--- a/src/videos/sos_overview.pptx
+++ b/src/videos/sos_overview.pptx
@@ -106,7 +106,7 @@
   </p:defaultTextStyle>
   <p:extLst>
     <p:ext uri="{EFAFB233-063F-42B5-8137-9DF3F51BA10A}">
-      <p15:sldGuideLst xmlns:p15="http://schemas.microsoft.com/office/powerpoint/2012/main" xmlns="">
+      <p15:sldGuideLst xmlns="" xmlns:p15="http://schemas.microsoft.com/office/powerpoint/2012/main">
         <p15:guide id="1" orient="horz" pos="1620">
           <p15:clr>
             <a:srgbClr val="A4A3A4"/>
@@ -3465,7 +3465,7 @@
           <a:p>
             <a:pPr algn="l">
               <a:spcBef>
-                <a:spcPts val="0"/>
+                <a:spcPts val="900"/>
               </a:spcBef>
             </a:pPr>
             <a:r>

</xml_diff>